<commit_message>
created better examples for Tilman to debug
</commit_message>
<xml_diff>
--- a/src/test/resources/org/contentmine/ami/pdf2svg2/primitives.pptx
+++ b/src/test/resources/org/contentmine/ami/pdf2svg2/primitives.pptx
@@ -288,7 +288,7 @@
           <a:p>
             <a:fld id="{5575C41F-A372-9846-BCFE-A7645FB51915}" type="datetimeFigureOut">
               <a:rPr lang="en-US" smtClean="0"/>
-              <a:t>29/12/19</a:t>
+              <a:t>31/12/19</a:t>
             </a:fld>
             <a:endParaRPr lang="en-US"/>
           </a:p>
@@ -458,7 +458,7 @@
           <a:p>
             <a:fld id="{5575C41F-A372-9846-BCFE-A7645FB51915}" type="datetimeFigureOut">
               <a:rPr lang="en-US" smtClean="0"/>
-              <a:t>29/12/19</a:t>
+              <a:t>31/12/19</a:t>
             </a:fld>
             <a:endParaRPr lang="en-US"/>
           </a:p>
@@ -638,7 +638,7 @@
           <a:p>
             <a:fld id="{5575C41F-A372-9846-BCFE-A7645FB51915}" type="datetimeFigureOut">
               <a:rPr lang="en-US" smtClean="0"/>
-              <a:t>29/12/19</a:t>
+              <a:t>31/12/19</a:t>
             </a:fld>
             <a:endParaRPr lang="en-US"/>
           </a:p>
@@ -808,7 +808,7 @@
           <a:p>
             <a:fld id="{5575C41F-A372-9846-BCFE-A7645FB51915}" type="datetimeFigureOut">
               <a:rPr lang="en-US" smtClean="0"/>
-              <a:t>29/12/19</a:t>
+              <a:t>31/12/19</a:t>
             </a:fld>
             <a:endParaRPr lang="en-US"/>
           </a:p>
@@ -1054,7 +1054,7 @@
           <a:p>
             <a:fld id="{5575C41F-A372-9846-BCFE-A7645FB51915}" type="datetimeFigureOut">
               <a:rPr lang="en-US" smtClean="0"/>
-              <a:t>29/12/19</a:t>
+              <a:t>31/12/19</a:t>
             </a:fld>
             <a:endParaRPr lang="en-US"/>
           </a:p>
@@ -1342,7 +1342,7 @@
           <a:p>
             <a:fld id="{5575C41F-A372-9846-BCFE-A7645FB51915}" type="datetimeFigureOut">
               <a:rPr lang="en-US" smtClean="0"/>
-              <a:t>29/12/19</a:t>
+              <a:t>31/12/19</a:t>
             </a:fld>
             <a:endParaRPr lang="en-US"/>
           </a:p>
@@ -1764,7 +1764,7 @@
           <a:p>
             <a:fld id="{5575C41F-A372-9846-BCFE-A7645FB51915}" type="datetimeFigureOut">
               <a:rPr lang="en-US" smtClean="0"/>
-              <a:t>29/12/19</a:t>
+              <a:t>31/12/19</a:t>
             </a:fld>
             <a:endParaRPr lang="en-US"/>
           </a:p>
@@ -1882,7 +1882,7 @@
           <a:p>
             <a:fld id="{5575C41F-A372-9846-BCFE-A7645FB51915}" type="datetimeFigureOut">
               <a:rPr lang="en-US" smtClean="0"/>
-              <a:t>29/12/19</a:t>
+              <a:t>31/12/19</a:t>
             </a:fld>
             <a:endParaRPr lang="en-US"/>
           </a:p>
@@ -1977,7 +1977,7 @@
           <a:p>
             <a:fld id="{5575C41F-A372-9846-BCFE-A7645FB51915}" type="datetimeFigureOut">
               <a:rPr lang="en-US" smtClean="0"/>
-              <a:t>29/12/19</a:t>
+              <a:t>31/12/19</a:t>
             </a:fld>
             <a:endParaRPr lang="en-US"/>
           </a:p>
@@ -2254,7 +2254,7 @@
           <a:p>
             <a:fld id="{5575C41F-A372-9846-BCFE-A7645FB51915}" type="datetimeFigureOut">
               <a:rPr lang="en-US" smtClean="0"/>
-              <a:t>29/12/19</a:t>
+              <a:t>31/12/19</a:t>
             </a:fld>
             <a:endParaRPr lang="en-US"/>
           </a:p>
@@ -2507,7 +2507,7 @@
           <a:p>
             <a:fld id="{5575C41F-A372-9846-BCFE-A7645FB51915}" type="datetimeFigureOut">
               <a:rPr lang="en-US" smtClean="0"/>
-              <a:t>29/12/19</a:t>
+              <a:t>31/12/19</a:t>
             </a:fld>
             <a:endParaRPr lang="en-US"/>
           </a:p>
@@ -2720,7 +2720,7 @@
           <a:p>
             <a:fld id="{5575C41F-A372-9846-BCFE-A7645FB51915}" type="datetimeFigureOut">
               <a:rPr lang="en-US" smtClean="0"/>
-              <a:t>29/12/19</a:t>
+              <a:t>31/12/19</a:t>
             </a:fld>
             <a:endParaRPr lang="en-US"/>
           </a:p>
@@ -3109,7 +3109,11 @@
           <a:prstGeom prst="line">
             <a:avLst/>
           </a:prstGeom>
-          <a:ln w="76200" cmpd="sng"/>
+          <a:ln w="76200" cmpd="sng">
+            <a:solidFill>
+              <a:srgbClr val="000090"/>
+            </a:solidFill>
+          </a:ln>
           <a:effectLst/>
         </p:spPr>
         <p:style>
@@ -3142,7 +3146,7 @@
             <a:avLst/>
           </a:prstGeom>
           <a:noFill/>
-          <a:ln>
+          <a:ln w="57150" cmpd="sng">
             <a:solidFill>
               <a:srgbClr val="FF0000"/>
             </a:solidFill>
@@ -3180,18 +3184,61 @@
         </p:nvSpPr>
         <p:spPr>
           <a:xfrm>
-            <a:off x="5320770" y="2574969"/>
+            <a:off x="3866043" y="2574969"/>
             <a:ext cx="2471583" cy="2403304"/>
           </a:xfrm>
           <a:prstGeom prst="ellipse">
             <a:avLst/>
           </a:prstGeom>
-          <a:noFill/>
+          <a:solidFill>
+            <a:srgbClr val="CCFFCC"/>
+          </a:solidFill>
           <a:ln w="38100" cmpd="sng">
             <a:solidFill>
               <a:srgbClr val="008000"/>
             </a:solidFill>
           </a:ln>
+          <a:effectLst/>
+        </p:spPr>
+        <p:style>
+          <a:lnRef idx="1">
+            <a:schemeClr val="accent1"/>
+          </a:lnRef>
+          <a:fillRef idx="3">
+            <a:schemeClr val="accent1"/>
+          </a:fillRef>
+          <a:effectRef idx="2">
+            <a:schemeClr val="accent1"/>
+          </a:effectRef>
+          <a:fontRef idx="minor">
+            <a:schemeClr val="lt1"/>
+          </a:fontRef>
+        </p:style>
+        <p:txBody>
+          <a:bodyPr rtlCol="0" anchor="ctr"/>
+          <a:lstStyle/>
+          <a:p>
+            <a:pPr algn="ctr"/>
+            <a:endParaRPr lang="en-US"/>
+          </a:p>
+        </p:txBody>
+      </p:sp>
+      <p:sp>
+        <p:nvSpPr>
+          <p:cNvPr id="2" name="Right Triangle 1"/>
+          <p:cNvSpPr/>
+          <p:nvPr/>
+        </p:nvSpPr>
+        <p:spPr>
+          <a:xfrm>
+            <a:off x="6973455" y="2805545"/>
+            <a:ext cx="1697181" cy="1639455"/>
+          </a:xfrm>
+          <a:prstGeom prst="rtTriangle">
+            <a:avLst/>
+          </a:prstGeom>
+          <a:noFill/>
+          <a:ln w="76200" cmpd="sng"/>
           <a:effectLst/>
         </p:spPr>
         <p:style>

</xml_diff>